<commit_message>
update item14 slide and project
</commit_message>
<xml_diff>
--- a/more-effective-csharp-2nd-edition/slides/item14-優先定義並實作介面進行繼承.pptx
+++ b/more-effective-csharp-2nd-edition/slides/item14-優先定義並實作介面進行繼承.pptx
@@ -5,10 +5,14 @@
     <p:sldMasterId id="2147483648" r:id="rId1"/>
   </p:sldMasterIdLst>
   <p:handoutMasterIdLst>
-    <p:handoutMasterId r:id="rId3"/>
+    <p:handoutMasterId r:id="rId7"/>
   </p:handoutMasterIdLst>
   <p:sldIdLst>
     <p:sldId id="259" r:id="rId2"/>
+    <p:sldId id="260" r:id="rId3"/>
+    <p:sldId id="261" r:id="rId4"/>
+    <p:sldId id="262" r:id="rId5"/>
+    <p:sldId id="263" r:id="rId6"/>
   </p:sldIdLst>
   <p:sldSz cx="9144000" cy="5143500" type="screen16x9"/>
   <p:notesSz cx="6797675" cy="9928225"/>
@@ -3486,6 +3490,480 @@
       </p:par>
     </p:tnLst>
   </p:timing>
+</p:sld>
+</file>
+
+<file path=ppt/slides/slide2.xml><?xml version="1.0" encoding="utf-8"?>
+<p:sld xmlns:a="http://schemas.openxmlformats.org/drawingml/2006/main" xmlns:r="http://schemas.openxmlformats.org/officeDocument/2006/relationships" xmlns:p="http://schemas.openxmlformats.org/presentationml/2006/main">
+  <p:cSld>
+    <p:spTree>
+      <p:nvGrpSpPr>
+        <p:cNvPr id="1" name=""/>
+        <p:cNvGrpSpPr/>
+        <p:nvPr/>
+      </p:nvGrpSpPr>
+      <p:grpSpPr>
+        <a:xfrm>
+          <a:off x="0" y="0"/>
+          <a:ext cx="0" cy="0"/>
+          <a:chOff x="0" y="0"/>
+          <a:chExt cx="0" cy="0"/>
+        </a:xfrm>
+      </p:grpSpPr>
+      <p:sp>
+        <p:nvSpPr>
+          <p:cNvPr id="2" name="標題 1"/>
+          <p:cNvSpPr>
+            <a:spLocks noGrp="1"/>
+          </p:cNvSpPr>
+          <p:nvPr>
+            <p:ph type="title"/>
+          </p:nvPr>
+        </p:nvSpPr>
+        <p:spPr/>
+        <p:txBody>
+          <a:bodyPr/>
+          <a:lstStyle/>
+          <a:p>
+            <a:r>
+              <a:rPr lang="en-US" altLang="zh-TW" dirty="0" smtClean="0"/>
+              <a:t>What-</a:t>
+            </a:r>
+            <a:r>
+              <a:rPr lang="zh-TW" altLang="en-US" dirty="0" smtClean="0"/>
+              <a:t>抽象基底類別和介面</a:t>
+            </a:r>
+            <a:endParaRPr lang="zh-TW" altLang="en-US" dirty="0"/>
+          </a:p>
+        </p:txBody>
+      </p:sp>
+      <p:sp>
+        <p:nvSpPr>
+          <p:cNvPr id="3" name="內容版面配置區 2"/>
+          <p:cNvSpPr>
+            <a:spLocks noGrp="1"/>
+          </p:cNvSpPr>
+          <p:nvPr>
+            <p:ph idx="1"/>
+          </p:nvPr>
+        </p:nvSpPr>
+        <p:spPr/>
+        <p:txBody>
+          <a:bodyPr>
+            <a:normAutofit/>
+          </a:bodyPr>
+          <a:lstStyle/>
+          <a:p>
+            <a:r>
+              <a:rPr lang="zh-TW" altLang="en-US" sz="2800" dirty="0"/>
+              <a:t>基底</a:t>
+            </a:r>
+            <a:r>
+              <a:rPr lang="zh-TW" altLang="en-US" sz="2800" dirty="0" smtClean="0"/>
+              <a:t>類別為一個類別階層提供一個共同的父類別</a:t>
+            </a:r>
+            <a:endParaRPr lang="en-US" altLang="zh-TW" sz="2800" dirty="0" smtClean="0"/>
+          </a:p>
+          <a:p>
+            <a:r>
+              <a:rPr lang="zh-TW" altLang="en-US" sz="2800" dirty="0" smtClean="0"/>
+              <a:t>介面是在描述一個型別中可供實作的相關方法</a:t>
+            </a:r>
+            <a:endParaRPr lang="en-US" altLang="zh-TW" sz="2800" dirty="0" smtClean="0"/>
+          </a:p>
+          <a:p>
+            <a:endParaRPr lang="en-US" altLang="zh-TW" sz="2800" dirty="0"/>
+          </a:p>
+          <a:p>
+            <a:r>
+              <a:rPr lang="zh-TW" altLang="en-US" sz="2800" dirty="0"/>
+              <a:t>基底</a:t>
+            </a:r>
+            <a:r>
+              <a:rPr lang="zh-TW" altLang="en-US" sz="2800" dirty="0" smtClean="0"/>
+              <a:t>類別描述一個物件是什麼</a:t>
+            </a:r>
+            <a:endParaRPr lang="en-US" altLang="zh-TW" sz="2800" dirty="0" smtClean="0"/>
+          </a:p>
+          <a:p>
+            <a:r>
+              <a:rPr lang="zh-TW" altLang="en-US" sz="2800" dirty="0" smtClean="0"/>
+              <a:t>介面是描述物件行為的一種方式</a:t>
+            </a:r>
+            <a:endParaRPr lang="en-US" altLang="zh-TW" sz="2800" dirty="0"/>
+          </a:p>
+          <a:p>
+            <a:endParaRPr lang="zh-TW" altLang="en-US" sz="2800" dirty="0"/>
+          </a:p>
+        </p:txBody>
+      </p:sp>
+    </p:spTree>
+    <p:extLst>
+      <p:ext uri="{BB962C8B-B14F-4D97-AF65-F5344CB8AC3E}">
+        <p14:creationId xmlns:p14="http://schemas.microsoft.com/office/powerpoint/2010/main" val="2977691604"/>
+      </p:ext>
+    </p:extLst>
+  </p:cSld>
+  <p:clrMapOvr>
+    <a:masterClrMapping/>
+  </p:clrMapOvr>
+</p:sld>
+</file>
+
+<file path=ppt/slides/slide3.xml><?xml version="1.0" encoding="utf-8"?>
+<p:sld xmlns:a="http://schemas.openxmlformats.org/drawingml/2006/main" xmlns:r="http://schemas.openxmlformats.org/officeDocument/2006/relationships" xmlns:p="http://schemas.openxmlformats.org/presentationml/2006/main">
+  <p:cSld>
+    <p:spTree>
+      <p:nvGrpSpPr>
+        <p:cNvPr id="1" name=""/>
+        <p:cNvGrpSpPr/>
+        <p:nvPr/>
+      </p:nvGrpSpPr>
+      <p:grpSpPr>
+        <a:xfrm>
+          <a:off x="0" y="0"/>
+          <a:ext cx="0" cy="0"/>
+          <a:chOff x="0" y="0"/>
+          <a:chExt cx="0" cy="0"/>
+        </a:xfrm>
+      </p:grpSpPr>
+      <p:sp>
+        <p:nvSpPr>
+          <p:cNvPr id="2" name="標題 1"/>
+          <p:cNvSpPr>
+            <a:spLocks noGrp="1"/>
+          </p:cNvSpPr>
+          <p:nvPr>
+            <p:ph type="title"/>
+          </p:nvPr>
+        </p:nvSpPr>
+        <p:spPr/>
+        <p:txBody>
+          <a:bodyPr/>
+          <a:lstStyle/>
+          <a:p>
+            <a:r>
+              <a:rPr lang="en-US" altLang="zh-TW" dirty="0" smtClean="0"/>
+              <a:t>What-</a:t>
+            </a:r>
+            <a:r>
+              <a:rPr lang="zh-TW" altLang="en-US" dirty="0" smtClean="0"/>
+              <a:t>抽象基底類別和介面</a:t>
+            </a:r>
+            <a:endParaRPr lang="zh-TW" altLang="en-US" dirty="0"/>
+          </a:p>
+        </p:txBody>
+      </p:sp>
+      <p:sp>
+        <p:nvSpPr>
+          <p:cNvPr id="3" name="內容版面配置區 2"/>
+          <p:cNvSpPr>
+            <a:spLocks noGrp="1"/>
+          </p:cNvSpPr>
+          <p:nvPr>
+            <p:ph idx="1"/>
+          </p:nvPr>
+        </p:nvSpPr>
+        <p:spPr/>
+        <p:txBody>
+          <a:bodyPr>
+            <a:normAutofit/>
+          </a:bodyPr>
+          <a:lstStyle/>
+          <a:p>
+            <a:r>
+              <a:rPr lang="zh-TW" altLang="en-US" sz="2800" dirty="0"/>
+              <a:t>在</a:t>
+            </a:r>
+            <a:r>
+              <a:rPr lang="zh-TW" altLang="en-US" sz="2800" dirty="0" smtClean="0"/>
+              <a:t>介面中不能包含任何實作</a:t>
+            </a:r>
+            <a:r>
+              <a:rPr lang="en-US" altLang="zh-TW" sz="2800" dirty="0" smtClean="0"/>
+              <a:t>,</a:t>
+            </a:r>
+            <a:r>
+              <a:rPr lang="zh-TW" altLang="en-US" sz="2800" dirty="0" smtClean="0"/>
+              <a:t>也不能包含任何具體的資料成員</a:t>
+            </a:r>
+            <a:endParaRPr lang="en-US" altLang="zh-TW" sz="2800" dirty="0" smtClean="0"/>
+          </a:p>
+          <a:p>
+            <a:r>
+              <a:rPr lang="zh-TW" altLang="en-US" sz="2800" dirty="0"/>
+              <a:t>而基底</a:t>
+            </a:r>
+            <a:r>
+              <a:rPr lang="zh-TW" altLang="en-US" sz="2800" dirty="0" smtClean="0"/>
+              <a:t>類別可以在描述共同的行為之外提供衍生型別一些實作</a:t>
+            </a:r>
+            <a:endParaRPr lang="en-US" altLang="zh-TW" sz="2800" dirty="0" smtClean="0"/>
+          </a:p>
+        </p:txBody>
+      </p:sp>
+    </p:spTree>
+    <p:extLst>
+      <p:ext uri="{BB962C8B-B14F-4D97-AF65-F5344CB8AC3E}">
+        <p14:creationId xmlns:p14="http://schemas.microsoft.com/office/powerpoint/2010/main" val="3812293279"/>
+      </p:ext>
+    </p:extLst>
+  </p:cSld>
+  <p:clrMapOvr>
+    <a:masterClrMapping/>
+  </p:clrMapOvr>
+</p:sld>
+</file>
+
+<file path=ppt/slides/slide4.xml><?xml version="1.0" encoding="utf-8"?>
+<p:sld xmlns:a="http://schemas.openxmlformats.org/drawingml/2006/main" xmlns:r="http://schemas.openxmlformats.org/officeDocument/2006/relationships" xmlns:p="http://schemas.openxmlformats.org/presentationml/2006/main">
+  <p:cSld>
+    <p:spTree>
+      <p:nvGrpSpPr>
+        <p:cNvPr id="1" name=""/>
+        <p:cNvGrpSpPr/>
+        <p:nvPr/>
+      </p:nvGrpSpPr>
+      <p:grpSpPr>
+        <a:xfrm>
+          <a:off x="0" y="0"/>
+          <a:ext cx="0" cy="0"/>
+          <a:chOff x="0" y="0"/>
+          <a:chExt cx="0" cy="0"/>
+        </a:xfrm>
+      </p:grpSpPr>
+      <p:sp>
+        <p:nvSpPr>
+          <p:cNvPr id="2" name="標題 1"/>
+          <p:cNvSpPr>
+            <a:spLocks noGrp="1"/>
+          </p:cNvSpPr>
+          <p:nvPr>
+            <p:ph type="title"/>
+          </p:nvPr>
+        </p:nvSpPr>
+        <p:spPr/>
+        <p:txBody>
+          <a:bodyPr/>
+          <a:lstStyle/>
+          <a:p>
+            <a:r>
+              <a:rPr lang="en-US" altLang="zh-TW" smtClean="0"/>
+              <a:t>Why-</a:t>
+            </a:r>
+            <a:r>
+              <a:rPr lang="zh-TW" altLang="en-US" smtClean="0"/>
+              <a:t>基</a:t>
+            </a:r>
+            <a:r>
+              <a:rPr lang="zh-TW" altLang="en-US" dirty="0"/>
+              <a:t>底類別</a:t>
+            </a:r>
+          </a:p>
+        </p:txBody>
+      </p:sp>
+      <p:sp>
+        <p:nvSpPr>
+          <p:cNvPr id="3" name="內容版面配置區 2"/>
+          <p:cNvSpPr>
+            <a:spLocks noGrp="1"/>
+          </p:cNvSpPr>
+          <p:nvPr>
+            <p:ph idx="1"/>
+          </p:nvPr>
+        </p:nvSpPr>
+        <p:spPr/>
+        <p:txBody>
+          <a:bodyPr/>
+          <a:lstStyle/>
+          <a:p>
+            <a:r>
+              <a:rPr lang="zh-TW" altLang="en-US" dirty="0" smtClean="0"/>
+              <a:t>擴充性比介面好</a:t>
+            </a:r>
+            <a:endParaRPr lang="en-US" altLang="zh-TW" dirty="0" smtClean="0"/>
+          </a:p>
+          <a:p>
+            <a:r>
+              <a:rPr lang="zh-TW" altLang="en-US" dirty="0" smtClean="0"/>
+              <a:t>基</a:t>
+            </a:r>
+            <a:r>
+              <a:rPr lang="zh-TW" altLang="en-US" dirty="0"/>
+              <a:t>底</a:t>
+            </a:r>
+            <a:r>
+              <a:rPr lang="zh-TW" altLang="en-US" dirty="0" smtClean="0"/>
+              <a:t>類別可以隨著時間進行擴充</a:t>
+            </a:r>
+            <a:r>
+              <a:rPr lang="en-US" altLang="zh-TW" dirty="0" smtClean="0"/>
+              <a:t>,</a:t>
+            </a:r>
+            <a:r>
+              <a:rPr lang="zh-TW" altLang="en-US" dirty="0" smtClean="0"/>
+              <a:t>而這些擴充會成為每一個衍生類別的一部分</a:t>
+            </a:r>
+            <a:endParaRPr lang="en-US" altLang="zh-TW" dirty="0" smtClean="0"/>
+          </a:p>
+          <a:p>
+            <a:r>
+              <a:rPr lang="zh-TW" altLang="en-US" dirty="0" smtClean="0"/>
+              <a:t>而當介面想要修改或擴充時</a:t>
+            </a:r>
+            <a:r>
+              <a:rPr lang="en-US" altLang="zh-TW" dirty="0" smtClean="0"/>
+              <a:t>,</a:t>
+            </a:r>
+            <a:r>
+              <a:rPr lang="zh-TW" altLang="en-US" dirty="0" smtClean="0"/>
+              <a:t>所有繼承此介面的類別都要跟著修改實作</a:t>
+            </a:r>
+            <a:endParaRPr lang="zh-TW" altLang="en-US" dirty="0"/>
+          </a:p>
+        </p:txBody>
+      </p:sp>
+    </p:spTree>
+    <p:extLst>
+      <p:ext uri="{BB962C8B-B14F-4D97-AF65-F5344CB8AC3E}">
+        <p14:creationId xmlns:p14="http://schemas.microsoft.com/office/powerpoint/2010/main" val="466184484"/>
+      </p:ext>
+    </p:extLst>
+  </p:cSld>
+  <p:clrMapOvr>
+    <a:masterClrMapping/>
+  </p:clrMapOvr>
+</p:sld>
+</file>
+
+<file path=ppt/slides/slide5.xml><?xml version="1.0" encoding="utf-8"?>
+<p:sld xmlns:a="http://schemas.openxmlformats.org/drawingml/2006/main" xmlns:r="http://schemas.openxmlformats.org/officeDocument/2006/relationships" xmlns:p="http://schemas.openxmlformats.org/presentationml/2006/main">
+  <p:cSld>
+    <p:spTree>
+      <p:nvGrpSpPr>
+        <p:cNvPr id="1" name=""/>
+        <p:cNvGrpSpPr/>
+        <p:nvPr/>
+      </p:nvGrpSpPr>
+      <p:grpSpPr>
+        <a:xfrm>
+          <a:off x="0" y="0"/>
+          <a:ext cx="0" cy="0"/>
+          <a:chOff x="0" y="0"/>
+          <a:chExt cx="0" cy="0"/>
+        </a:xfrm>
+      </p:grpSpPr>
+      <p:sp>
+        <p:nvSpPr>
+          <p:cNvPr id="2" name="標題 1"/>
+          <p:cNvSpPr>
+            <a:spLocks noGrp="1"/>
+          </p:cNvSpPr>
+          <p:nvPr>
+            <p:ph type="title"/>
+          </p:nvPr>
+        </p:nvSpPr>
+        <p:spPr/>
+        <p:txBody>
+          <a:bodyPr>
+            <a:normAutofit/>
+          </a:bodyPr>
+          <a:lstStyle/>
+          <a:p>
+            <a:r>
+              <a:rPr lang="en-US" altLang="zh-TW" dirty="0" smtClean="0"/>
+              <a:t>How</a:t>
+            </a:r>
+            <a:endParaRPr lang="zh-TW" altLang="en-US" dirty="0"/>
+          </a:p>
+        </p:txBody>
+      </p:sp>
+      <p:sp>
+        <p:nvSpPr>
+          <p:cNvPr id="3" name="內容版面配置區 2"/>
+          <p:cNvSpPr>
+            <a:spLocks noGrp="1"/>
+          </p:cNvSpPr>
+          <p:nvPr>
+            <p:ph idx="1"/>
+          </p:nvPr>
+        </p:nvSpPr>
+        <p:spPr/>
+        <p:txBody>
+          <a:bodyPr>
+            <a:normAutofit/>
+          </a:bodyPr>
+          <a:lstStyle/>
+          <a:p>
+            <a:r>
+              <a:rPr lang="en-US" altLang="zh-TW" sz="2800" dirty="0" err="1" smtClean="0"/>
+              <a:t>System.Linq.Enumerable</a:t>
+            </a:r>
+            <a:r>
+              <a:rPr lang="zh-TW" altLang="en-US" sz="2800" dirty="0" smtClean="0"/>
+              <a:t>類別中含有大量的擴充方法定義在</a:t>
+            </a:r>
+            <a:r>
+              <a:rPr lang="en-US" altLang="zh-TW" sz="2800" dirty="0" err="1" smtClean="0"/>
+              <a:t>IEnumerable</a:t>
+            </a:r>
+            <a:r>
+              <a:rPr lang="en-US" altLang="zh-TW" sz="2800" dirty="0" smtClean="0"/>
+              <a:t>&lt;T&gt;</a:t>
+            </a:r>
+            <a:r>
+              <a:rPr lang="zh-TW" altLang="en-US" sz="2800" dirty="0" smtClean="0"/>
+              <a:t>介面上</a:t>
+            </a:r>
+            <a:endParaRPr lang="en-US" altLang="zh-TW" sz="2800" dirty="0" smtClean="0"/>
+          </a:p>
+          <a:p>
+            <a:r>
+              <a:rPr lang="zh-TW" altLang="en-US" sz="2800" dirty="0"/>
+              <a:t>這樣任何實</a:t>
+            </a:r>
+            <a:r>
+              <a:rPr lang="zh-TW" altLang="en-US" sz="2800" dirty="0" smtClean="0"/>
+              <a:t>作</a:t>
+            </a:r>
+            <a:r>
+              <a:rPr lang="en-US" altLang="zh-TW" sz="2800" dirty="0" err="1"/>
+              <a:t>IEnumerable</a:t>
+            </a:r>
+            <a:r>
+              <a:rPr lang="en-US" altLang="zh-TW" sz="2800" dirty="0"/>
+              <a:t>&lt;T</a:t>
+            </a:r>
+            <a:r>
+              <a:rPr lang="en-US" altLang="zh-TW" sz="2800" dirty="0" smtClean="0"/>
+              <a:t>&gt;</a:t>
+            </a:r>
+            <a:r>
+              <a:rPr lang="zh-TW" altLang="en-US" sz="2800" dirty="0" smtClean="0"/>
+              <a:t>的類別表面上就包含所有</a:t>
+            </a:r>
+            <a:r>
+              <a:rPr lang="en-US" altLang="zh-TW" sz="2800" dirty="0" err="1" smtClean="0"/>
+              <a:t>Linq</a:t>
+            </a:r>
+            <a:r>
+              <a:rPr lang="zh-TW" altLang="en-US" sz="2800" dirty="0" smtClean="0"/>
+              <a:t>的擴充方法了</a:t>
+            </a:r>
+            <a:endParaRPr lang="zh-TW" altLang="en-US" sz="2800" dirty="0"/>
+          </a:p>
+        </p:txBody>
+      </p:sp>
+    </p:spTree>
+    <p:extLst>
+      <p:ext uri="{BB962C8B-B14F-4D97-AF65-F5344CB8AC3E}">
+        <p14:creationId xmlns:p14="http://schemas.microsoft.com/office/powerpoint/2010/main" val="335907837"/>
+      </p:ext>
+    </p:extLst>
+  </p:cSld>
+  <p:clrMapOvr>
+    <a:masterClrMapping/>
+  </p:clrMapOvr>
 </p:sld>
 </file>
 

</xml_diff>